<commit_message>
Updation Recommendation Feature Design Doc
</commit_message>
<xml_diff>
--- a/RecommendationFeature.pptx
+++ b/RecommendationFeature.pptx
@@ -6,6 +6,7 @@
   </p:sldMasterIdLst>
   <p:sldIdLst>
     <p:sldId id="256" r:id="rId2"/>
+    <p:sldId id="258" r:id="rId3"/>
   </p:sldIdLst>
   <p:sldSz cx="9144000" cy="6858000" type="screen4x3"/>
   <p:notesSz cx="6858000" cy="9144000"/>
@@ -288,7 +289,7 @@
           <a:p>
             <a:fld id="{2CE98A67-544D-42C4-A2DA-65795BCD6DCB}" type="datetimeFigureOut">
               <a:rPr lang="en-US" smtClean="0"/>
-              <a:t>12/31/2014</a:t>
+              <a:t>1/2/2015</a:t>
             </a:fld>
             <a:endParaRPr lang="en-US"/>
           </a:p>
@@ -458,7 +459,7 @@
           <a:p>
             <a:fld id="{2CE98A67-544D-42C4-A2DA-65795BCD6DCB}" type="datetimeFigureOut">
               <a:rPr lang="en-US" smtClean="0"/>
-              <a:t>12/31/2014</a:t>
+              <a:t>1/2/2015</a:t>
             </a:fld>
             <a:endParaRPr lang="en-US"/>
           </a:p>
@@ -638,7 +639,7 @@
           <a:p>
             <a:fld id="{2CE98A67-544D-42C4-A2DA-65795BCD6DCB}" type="datetimeFigureOut">
               <a:rPr lang="en-US" smtClean="0"/>
-              <a:t>12/31/2014</a:t>
+              <a:t>1/2/2015</a:t>
             </a:fld>
             <a:endParaRPr lang="en-US"/>
           </a:p>
@@ -808,7 +809,7 @@
           <a:p>
             <a:fld id="{2CE98A67-544D-42C4-A2DA-65795BCD6DCB}" type="datetimeFigureOut">
               <a:rPr lang="en-US" smtClean="0"/>
-              <a:t>12/31/2014</a:t>
+              <a:t>1/2/2015</a:t>
             </a:fld>
             <a:endParaRPr lang="en-US"/>
           </a:p>
@@ -1054,7 +1055,7 @@
           <a:p>
             <a:fld id="{2CE98A67-544D-42C4-A2DA-65795BCD6DCB}" type="datetimeFigureOut">
               <a:rPr lang="en-US" smtClean="0"/>
-              <a:t>12/31/2014</a:t>
+              <a:t>1/2/2015</a:t>
             </a:fld>
             <a:endParaRPr lang="en-US"/>
           </a:p>
@@ -1342,7 +1343,7 @@
           <a:p>
             <a:fld id="{2CE98A67-544D-42C4-A2DA-65795BCD6DCB}" type="datetimeFigureOut">
               <a:rPr lang="en-US" smtClean="0"/>
-              <a:t>12/31/2014</a:t>
+              <a:t>1/2/2015</a:t>
             </a:fld>
             <a:endParaRPr lang="en-US"/>
           </a:p>
@@ -1764,7 +1765,7 @@
           <a:p>
             <a:fld id="{2CE98A67-544D-42C4-A2DA-65795BCD6DCB}" type="datetimeFigureOut">
               <a:rPr lang="en-US" smtClean="0"/>
-              <a:t>12/31/2014</a:t>
+              <a:t>1/2/2015</a:t>
             </a:fld>
             <a:endParaRPr lang="en-US"/>
           </a:p>
@@ -1882,7 +1883,7 @@
           <a:p>
             <a:fld id="{2CE98A67-544D-42C4-A2DA-65795BCD6DCB}" type="datetimeFigureOut">
               <a:rPr lang="en-US" smtClean="0"/>
-              <a:t>12/31/2014</a:t>
+              <a:t>1/2/2015</a:t>
             </a:fld>
             <a:endParaRPr lang="en-US"/>
           </a:p>
@@ -1977,7 +1978,7 @@
           <a:p>
             <a:fld id="{2CE98A67-544D-42C4-A2DA-65795BCD6DCB}" type="datetimeFigureOut">
               <a:rPr lang="en-US" smtClean="0"/>
-              <a:t>12/31/2014</a:t>
+              <a:t>1/2/2015</a:t>
             </a:fld>
             <a:endParaRPr lang="en-US"/>
           </a:p>
@@ -2254,7 +2255,7 @@
           <a:p>
             <a:fld id="{2CE98A67-544D-42C4-A2DA-65795BCD6DCB}" type="datetimeFigureOut">
               <a:rPr lang="en-US" smtClean="0"/>
-              <a:t>12/31/2014</a:t>
+              <a:t>1/2/2015</a:t>
             </a:fld>
             <a:endParaRPr lang="en-US"/>
           </a:p>
@@ -2507,7 +2508,7 @@
           <a:p>
             <a:fld id="{2CE98A67-544D-42C4-A2DA-65795BCD6DCB}" type="datetimeFigureOut">
               <a:rPr lang="en-US" smtClean="0"/>
-              <a:t>12/31/2014</a:t>
+              <a:t>1/2/2015</a:t>
             </a:fld>
             <a:endParaRPr lang="en-US"/>
           </a:p>
@@ -2720,7 +2721,7 @@
           <a:p>
             <a:fld id="{2CE98A67-544D-42C4-A2DA-65795BCD6DCB}" type="datetimeFigureOut">
               <a:rPr lang="en-US" smtClean="0"/>
-              <a:t>12/31/2014</a:t>
+              <a:t>1/2/2015</a:t>
             </a:fld>
             <a:endParaRPr lang="en-US"/>
           </a:p>
@@ -3103,7 +3104,7 @@
         </p:nvGrpSpPr>
         <p:grpSpPr>
           <a:xfrm>
-            <a:off x="1066800" y="627221"/>
+            <a:off x="1066800" y="932021"/>
             <a:ext cx="6705600" cy="3048000"/>
             <a:chOff x="304800" y="457200"/>
             <a:chExt cx="6705600" cy="3048000"/>
@@ -3160,10 +3161,10 @@
               <a:p>
                 <a:pPr algn="ctr"/>
                 <a:r>
-                  <a:rPr lang="en-US" dirty="0" smtClean="0"/>
+                  <a:rPr lang="en-US" sz="1400" dirty="0"/>
                   <a:t>User</a:t>
                 </a:r>
-                <a:endParaRPr lang="en-US" dirty="0"/>
+                <a:endParaRPr lang="en-US" sz="1400" dirty="0"/>
               </a:p>
             </p:txBody>
           </p:sp>
@@ -3251,10 +3252,18 @@
               <a:p>
                 <a:pPr algn="ctr"/>
                 <a:r>
+                  <a:rPr lang="en-US" sz="1200" dirty="0"/>
+                  <a:t>Phone</a:t>
+                </a:r>
+                <a:r>
                   <a:rPr lang="en-US" sz="1400" dirty="0" smtClean="0"/>
-                  <a:t>Phone Controller</a:t>
+                  <a:t> </a:t>
                 </a:r>
-                <a:endParaRPr lang="en-US" sz="1400" dirty="0"/>
+                <a:r>
+                  <a:rPr lang="en-US" sz="1200" dirty="0"/>
+                  <a:t>Controller</a:t>
+                </a:r>
+                <a:endParaRPr lang="en-US" sz="1200" dirty="0"/>
               </a:p>
             </p:txBody>
           </p:sp>
@@ -3343,7 +3352,15 @@
                 <a:pPr algn="ctr"/>
                 <a:r>
                   <a:rPr lang="en-US" sz="1200" dirty="0" smtClean="0"/>
-                  <a:t>Phone View Tracker</a:t>
+                  <a:t>Phone </a:t>
+                </a:r>
+                <a:r>
+                  <a:rPr lang="en-US" sz="1400" dirty="0"/>
+                  <a:t>View</a:t>
+                </a:r>
+                <a:r>
+                  <a:rPr lang="en-US" sz="1200" dirty="0" smtClean="0"/>
+                  <a:t> Tracker</a:t>
                 </a:r>
                 <a:endParaRPr lang="en-US" sz="1200" dirty="0"/>
               </a:p>
@@ -3433,10 +3450,18 @@
               <a:p>
                 <a:pPr algn="ctr"/>
                 <a:r>
+                  <a:rPr lang="en-US" sz="1400" dirty="0"/>
+                  <a:t>Storage</a:t>
+                </a:r>
+                <a:r>
                   <a:rPr lang="en-US" sz="1600" dirty="0" smtClean="0"/>
-                  <a:t>Storage Agent</a:t>
+                  <a:t> </a:t>
                 </a:r>
-                <a:endParaRPr lang="en-US" sz="1600" dirty="0"/>
+                <a:r>
+                  <a:rPr lang="en-US" sz="1400" dirty="0"/>
+                  <a:t>Agent</a:t>
+                </a:r>
+                <a:endParaRPr lang="en-US" sz="1400" dirty="0"/>
               </a:p>
             </p:txBody>
           </p:sp>
@@ -3815,7 +3840,7 @@
         </p:nvGrpSpPr>
         <p:grpSpPr>
           <a:xfrm>
-            <a:off x="3200400" y="3962400"/>
+            <a:off x="2819400" y="4267200"/>
             <a:ext cx="3200400" cy="2133600"/>
             <a:chOff x="3200400" y="4495800"/>
             <a:chExt cx="3200400" cy="2133600"/>
@@ -4260,10 +4285,1360 @@
           </p:txBody>
         </p:sp>
       </p:grpSp>
+      <p:sp>
+        <p:nvSpPr>
+          <p:cNvPr id="2" name="TextBox 1"/>
+          <p:cNvSpPr txBox="1"/>
+          <p:nvPr/>
+        </p:nvSpPr>
+        <p:spPr>
+          <a:xfrm>
+            <a:off x="3114595" y="381000"/>
+            <a:ext cx="2752805" cy="369332"/>
+          </a:xfrm>
+          <a:prstGeom prst="rect">
+            <a:avLst/>
+          </a:prstGeom>
+          <a:noFill/>
+        </p:spPr>
+        <p:txBody>
+          <a:bodyPr wrap="none" rtlCol="0">
+            <a:spAutoFit/>
+          </a:bodyPr>
+          <a:lstStyle/>
+          <a:p>
+            <a:r>
+              <a:rPr lang="en-US" b="1" dirty="0" smtClean="0"/>
+              <a:t>User Phone Visit Workflow</a:t>
+            </a:r>
+            <a:endParaRPr lang="en-US" b="1" dirty="0"/>
+          </a:p>
+        </p:txBody>
+      </p:sp>
     </p:spTree>
     <p:extLst>
       <p:ext uri="{BB962C8B-B14F-4D97-AF65-F5344CB8AC3E}">
         <p14:creationId xmlns:p14="http://schemas.microsoft.com/office/powerpoint/2010/main" val="1962219620"/>
+      </p:ext>
+    </p:extLst>
+  </p:cSld>
+  <p:clrMapOvr>
+    <a:masterClrMapping/>
+  </p:clrMapOvr>
+  <p:timing>
+    <p:tnLst>
+      <p:par>
+        <p:cTn id="1" dur="indefinite" restart="never" nodeType="tmRoot"/>
+      </p:par>
+    </p:tnLst>
+  </p:timing>
+</p:sld>
+</file>
+
+<file path=ppt/slides/slide2.xml><?xml version="1.0" encoding="utf-8"?>
+<p:sld xmlns:a="http://schemas.openxmlformats.org/drawingml/2006/main" xmlns:r="http://schemas.openxmlformats.org/officeDocument/2006/relationships" xmlns:p="http://schemas.openxmlformats.org/presentationml/2006/main">
+  <p:cSld>
+    <p:spTree>
+      <p:nvGrpSpPr>
+        <p:cNvPr id="1" name=""/>
+        <p:cNvGrpSpPr/>
+        <p:nvPr/>
+      </p:nvGrpSpPr>
+      <p:grpSpPr>
+        <a:xfrm>
+          <a:off x="0" y="0"/>
+          <a:ext cx="0" cy="0"/>
+          <a:chOff x="0" y="0"/>
+          <a:chExt cx="0" cy="0"/>
+        </a:xfrm>
+      </p:grpSpPr>
+      <p:sp>
+        <p:nvSpPr>
+          <p:cNvPr id="2" name="TextBox 1"/>
+          <p:cNvSpPr txBox="1"/>
+          <p:nvPr/>
+        </p:nvSpPr>
+        <p:spPr>
+          <a:xfrm>
+            <a:off x="2110995" y="359229"/>
+            <a:ext cx="4498219" cy="369332"/>
+          </a:xfrm>
+          <a:prstGeom prst="rect">
+            <a:avLst/>
+          </a:prstGeom>
+          <a:noFill/>
+        </p:spPr>
+        <p:txBody>
+          <a:bodyPr wrap="none" rtlCol="0">
+            <a:spAutoFit/>
+          </a:bodyPr>
+          <a:lstStyle/>
+          <a:p>
+            <a:r>
+              <a:rPr lang="en-US" b="1" dirty="0"/>
+              <a:t>User Phone Visit Recommendation Workflow</a:t>
+            </a:r>
+            <a:endParaRPr lang="en-US" b="1" dirty="0"/>
+          </a:p>
+        </p:txBody>
+      </p:sp>
+      <p:grpSp>
+        <p:nvGrpSpPr>
+          <p:cNvPr id="67" name="Group 66"/>
+          <p:cNvGrpSpPr/>
+          <p:nvPr/>
+        </p:nvGrpSpPr>
+        <p:grpSpPr>
+          <a:xfrm>
+            <a:off x="2667000" y="4721424"/>
+            <a:ext cx="3886200" cy="1907976"/>
+            <a:chOff x="2667000" y="4721424"/>
+            <a:chExt cx="3886200" cy="1907976"/>
+          </a:xfrm>
+        </p:grpSpPr>
+        <p:grpSp>
+          <p:nvGrpSpPr>
+            <p:cNvPr id="59" name="Group 58"/>
+            <p:cNvGrpSpPr/>
+            <p:nvPr/>
+          </p:nvGrpSpPr>
+          <p:grpSpPr>
+            <a:xfrm>
+              <a:off x="2667000" y="4721424"/>
+              <a:ext cx="3886200" cy="1907976"/>
+              <a:chOff x="3074894" y="4495803"/>
+              <a:chExt cx="3200400" cy="2133600"/>
+            </a:xfrm>
+          </p:grpSpPr>
+          <p:sp>
+            <p:nvSpPr>
+              <p:cNvPr id="42" name="Rectangle 41"/>
+              <p:cNvSpPr/>
+              <p:nvPr/>
+            </p:nvSpPr>
+            <p:spPr>
+              <a:xfrm>
+                <a:off x="3074894" y="4495803"/>
+                <a:ext cx="3200400" cy="2133600"/>
+              </a:xfrm>
+              <a:prstGeom prst="rect">
+                <a:avLst/>
+              </a:prstGeom>
+              <a:noFill/>
+            </p:spPr>
+            <p:style>
+              <a:lnRef idx="2">
+                <a:schemeClr val="accent1">
+                  <a:shade val="50000"/>
+                </a:schemeClr>
+              </a:lnRef>
+              <a:fillRef idx="1">
+                <a:schemeClr val="accent1"/>
+              </a:fillRef>
+              <a:effectRef idx="0">
+                <a:schemeClr val="accent1"/>
+              </a:effectRef>
+              <a:fontRef idx="minor">
+                <a:schemeClr val="lt1"/>
+              </a:fontRef>
+            </p:style>
+            <p:txBody>
+              <a:bodyPr rtlCol="0" anchor="ctr"/>
+              <a:lstStyle/>
+              <a:p>
+                <a:pPr algn="ctr"/>
+                <a:endParaRPr lang="en-US"/>
+              </a:p>
+            </p:txBody>
+          </p:sp>
+          <p:sp>
+            <p:nvSpPr>
+              <p:cNvPr id="43" name="TextBox 42"/>
+              <p:cNvSpPr txBox="1"/>
+              <p:nvPr/>
+            </p:nvSpPr>
+            <p:spPr>
+              <a:xfrm>
+                <a:off x="4458354" y="4511244"/>
+                <a:ext cx="787075" cy="307777"/>
+              </a:xfrm>
+              <a:prstGeom prst="rect">
+                <a:avLst/>
+              </a:prstGeom>
+              <a:noFill/>
+            </p:spPr>
+            <p:txBody>
+              <a:bodyPr wrap="none" rtlCol="0">
+                <a:spAutoFit/>
+              </a:bodyPr>
+              <a:lstStyle/>
+              <a:p>
+                <a:pPr algn="ctr"/>
+                <a:r>
+                  <a:rPr lang="en-US" sz="1400" b="1" dirty="0" smtClean="0">
+                    <a:solidFill>
+                      <a:srgbClr val="00B0F0"/>
+                    </a:solidFill>
+                  </a:rPr>
+                  <a:t>Legends</a:t>
+                </a:r>
+                <a:endParaRPr lang="en-US" sz="1400" b="1" dirty="0">
+                  <a:solidFill>
+                    <a:srgbClr val="00B0F0"/>
+                  </a:solidFill>
+                </a:endParaRPr>
+              </a:p>
+            </p:txBody>
+          </p:sp>
+          <p:cxnSp>
+            <p:nvCxnSpPr>
+              <p:cNvPr id="46" name="Straight Arrow Connector 45"/>
+              <p:cNvCxnSpPr/>
+              <p:nvPr/>
+            </p:nvCxnSpPr>
+            <p:spPr>
+              <a:xfrm>
+                <a:off x="3263153" y="5334000"/>
+                <a:ext cx="761999" cy="0"/>
+              </a:xfrm>
+              <a:prstGeom prst="straightConnector1">
+                <a:avLst/>
+              </a:prstGeom>
+              <a:ln w="38100">
+                <a:solidFill>
+                  <a:schemeClr val="accent2"/>
+                </a:solidFill>
+                <a:prstDash val="sysDash"/>
+                <a:tailEnd type="arrow"/>
+              </a:ln>
+            </p:spPr>
+            <p:style>
+              <a:lnRef idx="1">
+                <a:schemeClr val="accent1"/>
+              </a:lnRef>
+              <a:fillRef idx="0">
+                <a:schemeClr val="accent1"/>
+              </a:fillRef>
+              <a:effectRef idx="0">
+                <a:schemeClr val="accent1"/>
+              </a:effectRef>
+              <a:fontRef idx="minor">
+                <a:schemeClr val="tx1"/>
+              </a:fontRef>
+            </p:style>
+          </p:cxnSp>
+          <p:sp>
+            <p:nvSpPr>
+              <p:cNvPr id="48" name="TextBox 47"/>
+              <p:cNvSpPr txBox="1"/>
+              <p:nvPr/>
+            </p:nvSpPr>
+            <p:spPr>
+              <a:xfrm>
+                <a:off x="4054860" y="4849678"/>
+                <a:ext cx="1372492" cy="307777"/>
+              </a:xfrm>
+              <a:prstGeom prst="rect">
+                <a:avLst/>
+              </a:prstGeom>
+              <a:noFill/>
+            </p:spPr>
+            <p:txBody>
+              <a:bodyPr wrap="none" rtlCol="0">
+                <a:spAutoFit/>
+              </a:bodyPr>
+              <a:lstStyle/>
+              <a:p>
+                <a:pPr algn="ctr"/>
+                <a:r>
+                  <a:rPr lang="en-US" sz="1400" b="1" dirty="0" smtClean="0"/>
+                  <a:t>SignalR </a:t>
+                </a:r>
+                <a:r>
+                  <a:rPr lang="en-US" sz="1400" b="1" dirty="0" smtClean="0"/>
+                  <a:t>Pipeline</a:t>
+                </a:r>
+                <a:endParaRPr lang="en-US" sz="1400" b="1" dirty="0"/>
+              </a:p>
+            </p:txBody>
+          </p:sp>
+          <p:sp>
+            <p:nvSpPr>
+              <p:cNvPr id="49" name="TextBox 48"/>
+              <p:cNvSpPr txBox="1"/>
+              <p:nvPr/>
+            </p:nvSpPr>
+            <p:spPr>
+              <a:xfrm>
+                <a:off x="4042118" y="5142011"/>
+                <a:ext cx="963952" cy="344172"/>
+              </a:xfrm>
+              <a:prstGeom prst="rect">
+                <a:avLst/>
+              </a:prstGeom>
+              <a:noFill/>
+            </p:spPr>
+            <p:txBody>
+              <a:bodyPr wrap="none" rtlCol="0">
+                <a:spAutoFit/>
+              </a:bodyPr>
+              <a:lstStyle/>
+              <a:p>
+                <a:pPr algn="ctr"/>
+                <a:r>
+                  <a:rPr lang="en-US" sz="1400" b="1" dirty="0" smtClean="0"/>
+                  <a:t>    Rx </a:t>
+                </a:r>
+                <a:r>
+                  <a:rPr lang="en-US" sz="1400" b="1" dirty="0" smtClean="0"/>
+                  <a:t>Pipeline</a:t>
+                </a:r>
+                <a:endParaRPr lang="en-US" sz="1400" b="1" dirty="0"/>
+              </a:p>
+            </p:txBody>
+          </p:sp>
+          <p:cxnSp>
+            <p:nvCxnSpPr>
+              <p:cNvPr id="51" name="Straight Arrow Connector 50"/>
+              <p:cNvCxnSpPr>
+                <a:endCxn id="54" idx="1"/>
+              </p:cNvCxnSpPr>
+              <p:nvPr/>
+            </p:nvCxnSpPr>
+            <p:spPr>
+              <a:xfrm flipV="1">
+                <a:off x="3263153" y="5655509"/>
+                <a:ext cx="889348" cy="1"/>
+              </a:xfrm>
+              <a:prstGeom prst="straightConnector1">
+                <a:avLst/>
+              </a:prstGeom>
+              <a:ln w="38100">
+                <a:prstDash val="sysDot"/>
+                <a:tailEnd type="arrow"/>
+              </a:ln>
+            </p:spPr>
+            <p:style>
+              <a:lnRef idx="2">
+                <a:schemeClr val="accent2"/>
+              </a:lnRef>
+              <a:fillRef idx="0">
+                <a:schemeClr val="accent2"/>
+              </a:fillRef>
+              <a:effectRef idx="1">
+                <a:schemeClr val="accent2"/>
+              </a:effectRef>
+              <a:fontRef idx="minor">
+                <a:schemeClr val="tx1"/>
+              </a:fontRef>
+            </p:style>
+          </p:cxnSp>
+          <p:sp>
+            <p:nvSpPr>
+              <p:cNvPr id="54" name="TextBox 53"/>
+              <p:cNvSpPr txBox="1"/>
+              <p:nvPr/>
+            </p:nvSpPr>
+            <p:spPr>
+              <a:xfrm>
+                <a:off x="4152501" y="5483423"/>
+                <a:ext cx="1250101" cy="344172"/>
+              </a:xfrm>
+              <a:prstGeom prst="rect">
+                <a:avLst/>
+              </a:prstGeom>
+              <a:noFill/>
+            </p:spPr>
+            <p:txBody>
+              <a:bodyPr wrap="none" rtlCol="0">
+                <a:spAutoFit/>
+              </a:bodyPr>
+              <a:lstStyle/>
+              <a:p>
+                <a:pPr algn="ctr"/>
+                <a:r>
+                  <a:rPr lang="en-US" sz="1400" b="1" dirty="0" smtClean="0"/>
+                  <a:t> F</a:t>
+                </a:r>
+                <a:r>
+                  <a:rPr lang="en-US" sz="1400" b="1" dirty="0" smtClean="0"/>
+                  <a:t># Agent Pipeline</a:t>
+                </a:r>
+                <a:endParaRPr lang="en-US" sz="1400" b="1" dirty="0"/>
+              </a:p>
+            </p:txBody>
+          </p:sp>
+          <p:sp>
+            <p:nvSpPr>
+              <p:cNvPr id="55" name="Rectangle 54"/>
+              <p:cNvSpPr/>
+              <p:nvPr/>
+            </p:nvSpPr>
+            <p:spPr>
+              <a:xfrm>
+                <a:off x="3594100" y="5943600"/>
+                <a:ext cx="444500" cy="152400"/>
+              </a:xfrm>
+              <a:prstGeom prst="rect">
+                <a:avLst/>
+              </a:prstGeom>
+              <a:solidFill>
+                <a:schemeClr val="tx1"/>
+              </a:solidFill>
+              <a:ln>
+                <a:solidFill>
+                  <a:schemeClr val="tx1"/>
+                </a:solidFill>
+              </a:ln>
+            </p:spPr>
+            <p:style>
+              <a:lnRef idx="2">
+                <a:schemeClr val="accent1">
+                  <a:shade val="50000"/>
+                </a:schemeClr>
+              </a:lnRef>
+              <a:fillRef idx="1">
+                <a:schemeClr val="accent1"/>
+              </a:fillRef>
+              <a:effectRef idx="0">
+                <a:schemeClr val="accent1"/>
+              </a:effectRef>
+              <a:fontRef idx="minor">
+                <a:schemeClr val="lt1"/>
+              </a:fontRef>
+            </p:style>
+            <p:txBody>
+              <a:bodyPr rtlCol="0" anchor="ctr"/>
+              <a:lstStyle/>
+              <a:p>
+                <a:pPr algn="ctr"/>
+                <a:endParaRPr lang="en-US"/>
+              </a:p>
+            </p:txBody>
+          </p:sp>
+          <p:sp>
+            <p:nvSpPr>
+              <p:cNvPr id="56" name="TextBox 55"/>
+              <p:cNvSpPr txBox="1"/>
+              <p:nvPr/>
+            </p:nvSpPr>
+            <p:spPr>
+              <a:xfrm>
+                <a:off x="4038600" y="5864423"/>
+                <a:ext cx="1178592" cy="307777"/>
+              </a:xfrm>
+              <a:prstGeom prst="rect">
+                <a:avLst/>
+              </a:prstGeom>
+              <a:noFill/>
+            </p:spPr>
+            <p:txBody>
+              <a:bodyPr wrap="none" rtlCol="0">
+                <a:spAutoFit/>
+              </a:bodyPr>
+              <a:lstStyle/>
+              <a:p>
+                <a:pPr algn="ctr"/>
+                <a:r>
+                  <a:rPr lang="en-US" sz="1400" b="1" dirty="0" smtClean="0"/>
+                  <a:t>Synchronous</a:t>
+                </a:r>
+                <a:endParaRPr lang="en-US" sz="1400" b="1" dirty="0"/>
+              </a:p>
+            </p:txBody>
+          </p:sp>
+          <p:sp>
+            <p:nvSpPr>
+              <p:cNvPr id="57" name="Rectangle 56"/>
+              <p:cNvSpPr/>
+              <p:nvPr/>
+            </p:nvSpPr>
+            <p:spPr>
+              <a:xfrm>
+                <a:off x="3603734" y="6251377"/>
+                <a:ext cx="444500" cy="152400"/>
+              </a:xfrm>
+              <a:prstGeom prst="rect">
+                <a:avLst/>
+              </a:prstGeom>
+              <a:solidFill>
+                <a:schemeClr val="accent2"/>
+              </a:solidFill>
+              <a:ln>
+                <a:solidFill>
+                  <a:schemeClr val="accent2"/>
+                </a:solidFill>
+              </a:ln>
+            </p:spPr>
+            <p:style>
+              <a:lnRef idx="2">
+                <a:schemeClr val="accent1">
+                  <a:shade val="50000"/>
+                </a:schemeClr>
+              </a:lnRef>
+              <a:fillRef idx="1">
+                <a:schemeClr val="accent1"/>
+              </a:fillRef>
+              <a:effectRef idx="0">
+                <a:schemeClr val="accent1"/>
+              </a:effectRef>
+              <a:fontRef idx="minor">
+                <a:schemeClr val="lt1"/>
+              </a:fontRef>
+            </p:style>
+            <p:txBody>
+              <a:bodyPr rtlCol="0" anchor="ctr"/>
+              <a:lstStyle/>
+              <a:p>
+                <a:pPr algn="ctr"/>
+                <a:endParaRPr lang="en-US"/>
+              </a:p>
+            </p:txBody>
+          </p:sp>
+          <p:sp>
+            <p:nvSpPr>
+              <p:cNvPr id="58" name="TextBox 57"/>
+              <p:cNvSpPr txBox="1"/>
+              <p:nvPr/>
+            </p:nvSpPr>
+            <p:spPr>
+              <a:xfrm>
+                <a:off x="3980172" y="6172200"/>
+                <a:ext cx="1314719" cy="307777"/>
+              </a:xfrm>
+              <a:prstGeom prst="rect">
+                <a:avLst/>
+              </a:prstGeom>
+              <a:noFill/>
+            </p:spPr>
+            <p:txBody>
+              <a:bodyPr wrap="none" rtlCol="0">
+                <a:spAutoFit/>
+              </a:bodyPr>
+              <a:lstStyle/>
+              <a:p>
+                <a:pPr algn="ctr"/>
+                <a:r>
+                  <a:rPr lang="en-US" sz="1400" b="1" dirty="0" smtClean="0"/>
+                  <a:t>  Asynchronous</a:t>
+                </a:r>
+                <a:endParaRPr lang="en-US" sz="1400" b="1" dirty="0"/>
+              </a:p>
+            </p:txBody>
+          </p:sp>
+        </p:grpSp>
+        <p:cxnSp>
+          <p:nvCxnSpPr>
+            <p:cNvPr id="45" name="Straight Arrow Connector 44"/>
+            <p:cNvCxnSpPr/>
+            <p:nvPr/>
+          </p:nvCxnSpPr>
+          <p:spPr>
+            <a:xfrm>
+              <a:off x="2895600" y="5204104"/>
+              <a:ext cx="961359" cy="0"/>
+            </a:xfrm>
+            <a:prstGeom prst="straightConnector1">
+              <a:avLst/>
+            </a:prstGeom>
+            <a:ln w="38100">
+              <a:solidFill>
+                <a:schemeClr val="accent2"/>
+              </a:solidFill>
+              <a:prstDash val="lgDashDotDot"/>
+              <a:tailEnd type="arrow"/>
+            </a:ln>
+          </p:spPr>
+          <p:style>
+            <a:lnRef idx="1">
+              <a:schemeClr val="accent1"/>
+            </a:lnRef>
+            <a:fillRef idx="0">
+              <a:schemeClr val="accent1"/>
+            </a:fillRef>
+            <a:effectRef idx="0">
+              <a:schemeClr val="accent1"/>
+            </a:effectRef>
+            <a:fontRef idx="minor">
+              <a:schemeClr val="tx1"/>
+            </a:fontRef>
+          </p:style>
+        </p:cxnSp>
+      </p:grpSp>
+      <p:sp>
+        <p:nvSpPr>
+          <p:cNvPr id="50" name="TextBox 49"/>
+          <p:cNvSpPr txBox="1"/>
+          <p:nvPr/>
+        </p:nvSpPr>
+        <p:spPr>
+          <a:xfrm>
+            <a:off x="5105400" y="2699519"/>
+            <a:ext cx="1600200" cy="577081"/>
+          </a:xfrm>
+          <a:prstGeom prst="rect">
+            <a:avLst/>
+          </a:prstGeom>
+          <a:noFill/>
+          <a:ln>
+            <a:noFill/>
+            <a:prstDash val="sysDash"/>
+          </a:ln>
+        </p:spPr>
+        <p:txBody>
+          <a:bodyPr wrap="square" rtlCol="0">
+            <a:spAutoFit/>
+          </a:bodyPr>
+          <a:lstStyle/>
+          <a:p>
+            <a:pPr algn="ctr"/>
+            <a:r>
+              <a:rPr lang="en-US" sz="1050" dirty="0" smtClean="0"/>
+              <a:t>Get recommendation for given user with given phone visit history</a:t>
+            </a:r>
+            <a:endParaRPr lang="en-US" sz="1050" dirty="0"/>
+          </a:p>
+        </p:txBody>
+      </p:sp>
+      <p:grpSp>
+        <p:nvGrpSpPr>
+          <p:cNvPr id="66" name="Group 65"/>
+          <p:cNvGrpSpPr/>
+          <p:nvPr/>
+        </p:nvGrpSpPr>
+        <p:grpSpPr>
+          <a:xfrm>
+            <a:off x="990600" y="1143000"/>
+            <a:ext cx="6705600" cy="3048000"/>
+            <a:chOff x="990600" y="1143000"/>
+            <a:chExt cx="6705600" cy="3048000"/>
+          </a:xfrm>
+        </p:grpSpPr>
+        <p:grpSp>
+          <p:nvGrpSpPr>
+            <p:cNvPr id="65" name="Group 64"/>
+            <p:cNvGrpSpPr/>
+            <p:nvPr/>
+          </p:nvGrpSpPr>
+          <p:grpSpPr>
+            <a:xfrm>
+              <a:off x="990600" y="1143000"/>
+              <a:ext cx="6705600" cy="3048000"/>
+              <a:chOff x="914400" y="1600200"/>
+              <a:chExt cx="6705600" cy="3048000"/>
+            </a:xfrm>
+          </p:grpSpPr>
+          <p:grpSp>
+            <p:nvGrpSpPr>
+              <p:cNvPr id="41" name="Group 40"/>
+              <p:cNvGrpSpPr/>
+              <p:nvPr/>
+            </p:nvGrpSpPr>
+            <p:grpSpPr>
+              <a:xfrm>
+                <a:off x="914400" y="1600200"/>
+                <a:ext cx="6705600" cy="3048000"/>
+                <a:chOff x="304800" y="457200"/>
+                <a:chExt cx="6705600" cy="3048000"/>
+              </a:xfrm>
+            </p:grpSpPr>
+            <p:grpSp>
+              <p:nvGrpSpPr>
+                <p:cNvPr id="7" name="Group 6"/>
+                <p:cNvGrpSpPr/>
+                <p:nvPr/>
+              </p:nvGrpSpPr>
+              <p:grpSpPr>
+                <a:xfrm>
+                  <a:off x="304800" y="457200"/>
+                  <a:ext cx="1524000" cy="3048000"/>
+                  <a:chOff x="304800" y="457200"/>
+                  <a:chExt cx="1524000" cy="5562600"/>
+                </a:xfrm>
+              </p:grpSpPr>
+              <p:sp>
+                <p:nvSpPr>
+                  <p:cNvPr id="4" name="Rectangle 3"/>
+                  <p:cNvSpPr/>
+                  <p:nvPr/>
+                </p:nvSpPr>
+                <p:spPr>
+                  <a:xfrm>
+                    <a:off x="304800" y="457200"/>
+                    <a:ext cx="1524000" cy="834390"/>
+                  </a:xfrm>
+                  <a:prstGeom prst="rect">
+                    <a:avLst/>
+                  </a:prstGeom>
+                </p:spPr>
+                <p:style>
+                  <a:lnRef idx="2">
+                    <a:schemeClr val="accent1">
+                      <a:shade val="50000"/>
+                    </a:schemeClr>
+                  </a:lnRef>
+                  <a:fillRef idx="1">
+                    <a:schemeClr val="accent1"/>
+                  </a:fillRef>
+                  <a:effectRef idx="0">
+                    <a:schemeClr val="accent1"/>
+                  </a:effectRef>
+                  <a:fontRef idx="minor">
+                    <a:schemeClr val="lt1"/>
+                  </a:fontRef>
+                </p:style>
+                <p:txBody>
+                  <a:bodyPr rtlCol="0" anchor="ctr"/>
+                  <a:lstStyle/>
+                  <a:p>
+                    <a:pPr algn="ctr"/>
+                    <a:r>
+                      <a:rPr lang="en-US" sz="1400" dirty="0"/>
+                      <a:t>User</a:t>
+                    </a:r>
+                    <a:endParaRPr lang="en-US" sz="1400" dirty="0"/>
+                  </a:p>
+                </p:txBody>
+              </p:sp>
+              <p:cxnSp>
+                <p:nvCxnSpPr>
+                  <p:cNvPr id="6" name="Straight Connector 5"/>
+                  <p:cNvCxnSpPr>
+                    <a:stCxn id="4" idx="2"/>
+                  </p:cNvCxnSpPr>
+                  <p:nvPr/>
+                </p:nvCxnSpPr>
+                <p:spPr>
+                  <a:xfrm>
+                    <a:off x="1066800" y="1291590"/>
+                    <a:ext cx="0" cy="4728210"/>
+                  </a:xfrm>
+                  <a:prstGeom prst="line">
+                    <a:avLst/>
+                  </a:prstGeom>
+                </p:spPr>
+                <p:style>
+                  <a:lnRef idx="1">
+                    <a:schemeClr val="accent1"/>
+                  </a:lnRef>
+                  <a:fillRef idx="0">
+                    <a:schemeClr val="accent1"/>
+                  </a:fillRef>
+                  <a:effectRef idx="0">
+                    <a:schemeClr val="accent1"/>
+                  </a:effectRef>
+                  <a:fontRef idx="minor">
+                    <a:schemeClr val="tx1"/>
+                  </a:fontRef>
+                </p:style>
+              </p:cxnSp>
+            </p:grpSp>
+            <p:grpSp>
+              <p:nvGrpSpPr>
+                <p:cNvPr id="8" name="Group 7"/>
+                <p:cNvGrpSpPr/>
+                <p:nvPr/>
+              </p:nvGrpSpPr>
+              <p:grpSpPr>
+                <a:xfrm>
+                  <a:off x="1981200" y="457200"/>
+                  <a:ext cx="1524000" cy="3009900"/>
+                  <a:chOff x="304800" y="457200"/>
+                  <a:chExt cx="1524000" cy="3009900"/>
+                </a:xfrm>
+              </p:grpSpPr>
+              <p:sp>
+                <p:nvSpPr>
+                  <p:cNvPr id="9" name="Rectangle 8"/>
+                  <p:cNvSpPr/>
+                  <p:nvPr/>
+                </p:nvSpPr>
+                <p:spPr>
+                  <a:xfrm>
+                    <a:off x="304800" y="457200"/>
+                    <a:ext cx="1524000" cy="457200"/>
+                  </a:xfrm>
+                  <a:prstGeom prst="rect">
+                    <a:avLst/>
+                  </a:prstGeom>
+                </p:spPr>
+                <p:style>
+                  <a:lnRef idx="2">
+                    <a:schemeClr val="accent1">
+                      <a:shade val="50000"/>
+                    </a:schemeClr>
+                  </a:lnRef>
+                  <a:fillRef idx="1">
+                    <a:schemeClr val="accent1"/>
+                  </a:fillRef>
+                  <a:effectRef idx="0">
+                    <a:schemeClr val="accent1"/>
+                  </a:effectRef>
+                  <a:fontRef idx="minor">
+                    <a:schemeClr val="lt1"/>
+                  </a:fontRef>
+                </p:style>
+                <p:txBody>
+                  <a:bodyPr rtlCol="0" anchor="ctr"/>
+                  <a:lstStyle/>
+                  <a:p>
+                    <a:pPr algn="ctr"/>
+                    <a:r>
+                      <a:rPr lang="en-US" sz="1200" dirty="0" smtClean="0"/>
+                      <a:t>Recommendation SignalR Hub</a:t>
+                    </a:r>
+                    <a:endParaRPr lang="en-US" sz="1200" dirty="0"/>
+                  </a:p>
+                </p:txBody>
+              </p:sp>
+              <p:cxnSp>
+                <p:nvCxnSpPr>
+                  <p:cNvPr id="10" name="Straight Connector 9"/>
+                  <p:cNvCxnSpPr>
+                    <a:stCxn id="9" idx="2"/>
+                  </p:cNvCxnSpPr>
+                  <p:nvPr/>
+                </p:nvCxnSpPr>
+                <p:spPr>
+                  <a:xfrm>
+                    <a:off x="1066800" y="914400"/>
+                    <a:ext cx="0" cy="2552700"/>
+                  </a:xfrm>
+                  <a:prstGeom prst="line">
+                    <a:avLst/>
+                  </a:prstGeom>
+                </p:spPr>
+                <p:style>
+                  <a:lnRef idx="1">
+                    <a:schemeClr val="accent1"/>
+                  </a:lnRef>
+                  <a:fillRef idx="0">
+                    <a:schemeClr val="accent1"/>
+                  </a:fillRef>
+                  <a:effectRef idx="0">
+                    <a:schemeClr val="accent1"/>
+                  </a:effectRef>
+                  <a:fontRef idx="minor">
+                    <a:schemeClr val="tx1"/>
+                  </a:fontRef>
+                </p:style>
+              </p:cxnSp>
+            </p:grpSp>
+            <p:grpSp>
+              <p:nvGrpSpPr>
+                <p:cNvPr id="11" name="Group 10"/>
+                <p:cNvGrpSpPr/>
+                <p:nvPr/>
+              </p:nvGrpSpPr>
+              <p:grpSpPr>
+                <a:xfrm>
+                  <a:off x="3733800" y="457200"/>
+                  <a:ext cx="1524000" cy="2220686"/>
+                  <a:chOff x="3581400" y="321733"/>
+                  <a:chExt cx="1524000" cy="2220686"/>
+                </a:xfrm>
+              </p:grpSpPr>
+              <p:sp>
+                <p:nvSpPr>
+                  <p:cNvPr id="12" name="Rectangle 11"/>
+                  <p:cNvSpPr/>
+                  <p:nvPr/>
+                </p:nvSpPr>
+                <p:spPr>
+                  <a:xfrm>
+                    <a:off x="3581400" y="321733"/>
+                    <a:ext cx="1524000" cy="457200"/>
+                  </a:xfrm>
+                  <a:prstGeom prst="rect">
+                    <a:avLst/>
+                  </a:prstGeom>
+                </p:spPr>
+                <p:style>
+                  <a:lnRef idx="2">
+                    <a:schemeClr val="accent1">
+                      <a:shade val="50000"/>
+                    </a:schemeClr>
+                  </a:lnRef>
+                  <a:fillRef idx="1">
+                    <a:schemeClr val="accent1"/>
+                  </a:fillRef>
+                  <a:effectRef idx="0">
+                    <a:schemeClr val="accent1"/>
+                  </a:effectRef>
+                  <a:fontRef idx="minor">
+                    <a:schemeClr val="lt1"/>
+                  </a:fontRef>
+                </p:style>
+                <p:txBody>
+                  <a:bodyPr rtlCol="0" anchor="ctr"/>
+                  <a:lstStyle/>
+                  <a:p>
+                    <a:pPr algn="ctr"/>
+                    <a:r>
+                      <a:rPr lang="en-US" sz="1200" dirty="0" smtClean="0"/>
+                      <a:t>Storage Agent</a:t>
+                    </a:r>
+                    <a:endParaRPr lang="en-US" sz="1200" dirty="0"/>
+                  </a:p>
+                </p:txBody>
+              </p:sp>
+              <p:cxnSp>
+                <p:nvCxnSpPr>
+                  <p:cNvPr id="13" name="Straight Connector 12"/>
+                  <p:cNvCxnSpPr>
+                    <a:stCxn id="12" idx="2"/>
+                  </p:cNvCxnSpPr>
+                  <p:nvPr/>
+                </p:nvCxnSpPr>
+                <p:spPr>
+                  <a:xfrm>
+                    <a:off x="4343400" y="778933"/>
+                    <a:ext cx="25400" cy="1763486"/>
+                  </a:xfrm>
+                  <a:prstGeom prst="line">
+                    <a:avLst/>
+                  </a:prstGeom>
+                </p:spPr>
+                <p:style>
+                  <a:lnRef idx="1">
+                    <a:schemeClr val="accent1"/>
+                  </a:lnRef>
+                  <a:fillRef idx="0">
+                    <a:schemeClr val="accent1"/>
+                  </a:fillRef>
+                  <a:effectRef idx="0">
+                    <a:schemeClr val="accent1"/>
+                  </a:effectRef>
+                  <a:fontRef idx="minor">
+                    <a:schemeClr val="tx1"/>
+                  </a:fontRef>
+                </p:style>
+              </p:cxnSp>
+            </p:grpSp>
+            <p:grpSp>
+              <p:nvGrpSpPr>
+                <p:cNvPr id="14" name="Group 13"/>
+                <p:cNvGrpSpPr/>
+                <p:nvPr/>
+              </p:nvGrpSpPr>
+              <p:grpSpPr>
+                <a:xfrm>
+                  <a:off x="5486400" y="457200"/>
+                  <a:ext cx="1524000" cy="3009900"/>
+                  <a:chOff x="3581400" y="321733"/>
+                  <a:chExt cx="1524000" cy="5562600"/>
+                </a:xfrm>
+              </p:grpSpPr>
+              <p:sp>
+                <p:nvSpPr>
+                  <p:cNvPr id="15" name="Rectangle 14"/>
+                  <p:cNvSpPr/>
+                  <p:nvPr/>
+                </p:nvSpPr>
+                <p:spPr>
+                  <a:xfrm>
+                    <a:off x="3581400" y="321733"/>
+                    <a:ext cx="1524000" cy="844952"/>
+                  </a:xfrm>
+                  <a:prstGeom prst="rect">
+                    <a:avLst/>
+                  </a:prstGeom>
+                </p:spPr>
+                <p:style>
+                  <a:lnRef idx="2">
+                    <a:schemeClr val="accent1">
+                      <a:shade val="50000"/>
+                    </a:schemeClr>
+                  </a:lnRef>
+                  <a:fillRef idx="1">
+                    <a:schemeClr val="accent1"/>
+                  </a:fillRef>
+                  <a:effectRef idx="0">
+                    <a:schemeClr val="accent1"/>
+                  </a:effectRef>
+                  <a:fontRef idx="minor">
+                    <a:schemeClr val="lt1"/>
+                  </a:fontRef>
+                </p:style>
+                <p:txBody>
+                  <a:bodyPr rtlCol="0" anchor="ctr"/>
+                  <a:lstStyle/>
+                  <a:p>
+                    <a:pPr algn="ctr"/>
+                    <a:r>
+                      <a:rPr lang="en-US" sz="1400" dirty="0" smtClean="0"/>
+                      <a:t>Recommendation Agent</a:t>
+                    </a:r>
+                    <a:endParaRPr lang="en-US" sz="1400" dirty="0"/>
+                  </a:p>
+                </p:txBody>
+              </p:sp>
+              <p:cxnSp>
+                <p:nvCxnSpPr>
+                  <p:cNvPr id="16" name="Straight Connector 15"/>
+                  <p:cNvCxnSpPr>
+                    <a:stCxn id="15" idx="2"/>
+                  </p:cNvCxnSpPr>
+                  <p:nvPr/>
+                </p:nvCxnSpPr>
+                <p:spPr>
+                  <a:xfrm>
+                    <a:off x="4343400" y="1166685"/>
+                    <a:ext cx="0" cy="4717648"/>
+                  </a:xfrm>
+                  <a:prstGeom prst="line">
+                    <a:avLst/>
+                  </a:prstGeom>
+                </p:spPr>
+                <p:style>
+                  <a:lnRef idx="1">
+                    <a:schemeClr val="accent1"/>
+                  </a:lnRef>
+                  <a:fillRef idx="0">
+                    <a:schemeClr val="accent1"/>
+                  </a:fillRef>
+                  <a:effectRef idx="0">
+                    <a:schemeClr val="accent1"/>
+                  </a:effectRef>
+                  <a:fontRef idx="minor">
+                    <a:schemeClr val="tx1"/>
+                  </a:fontRef>
+                </p:style>
+              </p:cxnSp>
+            </p:grpSp>
+            <p:grpSp>
+              <p:nvGrpSpPr>
+                <p:cNvPr id="20" name="Group 19"/>
+                <p:cNvGrpSpPr/>
+                <p:nvPr/>
+              </p:nvGrpSpPr>
+              <p:grpSpPr>
+                <a:xfrm>
+                  <a:off x="1066800" y="1219200"/>
+                  <a:ext cx="1676400" cy="304800"/>
+                  <a:chOff x="1066800" y="914400"/>
+                  <a:chExt cx="1676400" cy="304800"/>
+                </a:xfrm>
+              </p:grpSpPr>
+              <p:cxnSp>
+                <p:nvCxnSpPr>
+                  <p:cNvPr id="18" name="Straight Arrow Connector 17"/>
+                  <p:cNvCxnSpPr/>
+                  <p:nvPr/>
+                </p:nvCxnSpPr>
+                <p:spPr>
+                  <a:xfrm>
+                    <a:off x="1066800" y="1219200"/>
+                    <a:ext cx="1676400" cy="0"/>
+                  </a:xfrm>
+                  <a:prstGeom prst="straightConnector1">
+                    <a:avLst/>
+                  </a:prstGeom>
+                  <a:ln w="38100">
+                    <a:solidFill>
+                      <a:schemeClr val="accent2"/>
+                    </a:solidFill>
+                    <a:prstDash val="lgDashDotDot"/>
+                    <a:tailEnd type="arrow"/>
+                  </a:ln>
+                </p:spPr>
+                <p:style>
+                  <a:lnRef idx="1">
+                    <a:schemeClr val="accent1"/>
+                  </a:lnRef>
+                  <a:fillRef idx="0">
+                    <a:schemeClr val="accent1"/>
+                  </a:fillRef>
+                  <a:effectRef idx="0">
+                    <a:schemeClr val="accent1"/>
+                  </a:effectRef>
+                  <a:fontRef idx="minor">
+                    <a:schemeClr val="tx1"/>
+                  </a:fontRef>
+                </p:style>
+              </p:cxnSp>
+              <p:sp>
+                <p:nvSpPr>
+                  <p:cNvPr id="19" name="TextBox 18"/>
+                  <p:cNvSpPr txBox="1"/>
+                  <p:nvPr/>
+                </p:nvSpPr>
+                <p:spPr>
+                  <a:xfrm>
+                    <a:off x="1104900" y="914400"/>
+                    <a:ext cx="1600200" cy="253916"/>
+                  </a:xfrm>
+                  <a:prstGeom prst="rect">
+                    <a:avLst/>
+                  </a:prstGeom>
+                  <a:noFill/>
+                </p:spPr>
+                <p:txBody>
+                  <a:bodyPr wrap="square" rtlCol="0">
+                    <a:spAutoFit/>
+                  </a:bodyPr>
+                  <a:lstStyle/>
+                  <a:p>
+                    <a:pPr algn="ctr"/>
+                    <a:r>
+                      <a:rPr lang="en-US" sz="1050" dirty="0" smtClean="0"/>
+                      <a:t>Get recommendation</a:t>
+                    </a:r>
+                    <a:endParaRPr lang="en-US" sz="1050" dirty="0"/>
+                  </a:p>
+                </p:txBody>
+              </p:sp>
+            </p:grpSp>
+            <p:sp>
+              <p:nvSpPr>
+                <p:cNvPr id="23" name="TextBox 22"/>
+                <p:cNvSpPr txBox="1"/>
+                <p:nvPr/>
+              </p:nvSpPr>
+              <p:spPr>
+                <a:xfrm>
+                  <a:off x="2819400" y="1524000"/>
+                  <a:ext cx="1600200" cy="415498"/>
+                </a:xfrm>
+                <a:prstGeom prst="rect">
+                  <a:avLst/>
+                </a:prstGeom>
+                <a:noFill/>
+                <a:ln>
+                  <a:noFill/>
+                  <a:prstDash val="sysDash"/>
+                </a:ln>
+              </p:spPr>
+              <p:txBody>
+                <a:bodyPr wrap="square" rtlCol="0">
+                  <a:spAutoFit/>
+                </a:bodyPr>
+                <a:lstStyle/>
+                <a:p>
+                  <a:pPr algn="ctr"/>
+                  <a:r>
+                    <a:rPr lang="en-US" sz="1050" dirty="0" smtClean="0"/>
+                    <a:t>Get recommendation for given user</a:t>
+                  </a:r>
+                  <a:endParaRPr lang="en-US" sz="1050" dirty="0"/>
+                </a:p>
+              </p:txBody>
+            </p:sp>
+            <p:cxnSp>
+              <p:nvCxnSpPr>
+                <p:cNvPr id="25" name="Straight Arrow Connector 24"/>
+                <p:cNvCxnSpPr/>
+                <p:nvPr/>
+              </p:nvCxnSpPr>
+              <p:spPr>
+                <a:xfrm>
+                  <a:off x="4521200" y="2209800"/>
+                  <a:ext cx="1676400" cy="0"/>
+                </a:xfrm>
+                <a:prstGeom prst="straightConnector1">
+                  <a:avLst/>
+                </a:prstGeom>
+                <a:ln w="38100">
+                  <a:prstDash val="sysDot"/>
+                  <a:tailEnd type="arrow"/>
+                </a:ln>
+              </p:spPr>
+              <p:style>
+                <a:lnRef idx="2">
+                  <a:schemeClr val="accent2"/>
+                </a:lnRef>
+                <a:fillRef idx="0">
+                  <a:schemeClr val="accent2"/>
+                </a:fillRef>
+                <a:effectRef idx="1">
+                  <a:schemeClr val="accent2"/>
+                </a:effectRef>
+                <a:fontRef idx="minor">
+                  <a:schemeClr val="tx1"/>
+                </a:fontRef>
+              </p:style>
+            </p:cxnSp>
+          </p:grpSp>
+          <p:cxnSp>
+            <p:nvCxnSpPr>
+              <p:cNvPr id="47" name="Straight Arrow Connector 46"/>
+              <p:cNvCxnSpPr/>
+              <p:nvPr/>
+            </p:nvCxnSpPr>
+            <p:spPr>
+              <a:xfrm>
+                <a:off x="3403600" y="3147812"/>
+                <a:ext cx="1676400" cy="0"/>
+              </a:xfrm>
+              <a:prstGeom prst="straightConnector1">
+                <a:avLst/>
+              </a:prstGeom>
+              <a:ln w="38100">
+                <a:prstDash val="sysDot"/>
+                <a:tailEnd type="arrow"/>
+              </a:ln>
+            </p:spPr>
+            <p:style>
+              <a:lnRef idx="2">
+                <a:schemeClr val="accent2"/>
+              </a:lnRef>
+              <a:fillRef idx="0">
+                <a:schemeClr val="accent2"/>
+              </a:fillRef>
+              <a:effectRef idx="1">
+                <a:schemeClr val="accent2"/>
+              </a:effectRef>
+              <a:fontRef idx="minor">
+                <a:schemeClr val="tx1"/>
+              </a:fontRef>
+            </p:style>
+          </p:cxnSp>
+          <p:cxnSp>
+            <p:nvCxnSpPr>
+              <p:cNvPr id="39" name="Straight Arrow Connector 38"/>
+              <p:cNvCxnSpPr/>
+              <p:nvPr/>
+            </p:nvCxnSpPr>
+            <p:spPr>
+              <a:xfrm flipH="1">
+                <a:off x="3376279" y="4038600"/>
+                <a:ext cx="3481721" cy="0"/>
+              </a:xfrm>
+              <a:prstGeom prst="straightConnector1">
+                <a:avLst/>
+              </a:prstGeom>
+              <a:ln w="38100">
+                <a:solidFill>
+                  <a:schemeClr val="accent2"/>
+                </a:solidFill>
+                <a:prstDash val="sysDash"/>
+                <a:tailEnd type="arrow"/>
+              </a:ln>
+            </p:spPr>
+            <p:style>
+              <a:lnRef idx="1">
+                <a:schemeClr val="accent1"/>
+              </a:lnRef>
+              <a:fillRef idx="0">
+                <a:schemeClr val="accent1"/>
+              </a:fillRef>
+              <a:effectRef idx="0">
+                <a:schemeClr val="accent1"/>
+              </a:effectRef>
+              <a:fontRef idx="minor">
+                <a:schemeClr val="tx1"/>
+              </a:fontRef>
+            </p:style>
+          </p:cxnSp>
+          <p:sp>
+            <p:nvSpPr>
+              <p:cNvPr id="60" name="TextBox 59"/>
+              <p:cNvSpPr txBox="1"/>
+              <p:nvPr/>
+            </p:nvSpPr>
+            <p:spPr>
+              <a:xfrm>
+                <a:off x="4346916" y="4038600"/>
+                <a:ext cx="1600200" cy="577081"/>
+              </a:xfrm>
+              <a:prstGeom prst="rect">
+                <a:avLst/>
+              </a:prstGeom>
+              <a:noFill/>
+              <a:ln>
+                <a:noFill/>
+                <a:prstDash val="sysDash"/>
+              </a:ln>
+            </p:spPr>
+            <p:txBody>
+              <a:bodyPr wrap="square" rtlCol="0">
+                <a:spAutoFit/>
+              </a:bodyPr>
+              <a:lstStyle/>
+              <a:p>
+                <a:pPr algn="ctr"/>
+                <a:r>
+                  <a:rPr lang="en-US" sz="1050" dirty="0" smtClean="0"/>
+                  <a:t>Recommended Phone Id for given user.  / No Recommendation</a:t>
+                </a:r>
+                <a:endParaRPr lang="en-US" sz="1050" dirty="0"/>
+              </a:p>
+            </p:txBody>
+          </p:sp>
+        </p:grpSp>
+        <p:cxnSp>
+          <p:nvCxnSpPr>
+            <p:cNvPr id="63" name="Straight Arrow Connector 62"/>
+            <p:cNvCxnSpPr/>
+            <p:nvPr/>
+          </p:nvCxnSpPr>
+          <p:spPr>
+            <a:xfrm flipH="1">
+              <a:off x="1752600" y="4029418"/>
+              <a:ext cx="1676400" cy="0"/>
+            </a:xfrm>
+            <a:prstGeom prst="straightConnector1">
+              <a:avLst/>
+            </a:prstGeom>
+            <a:ln w="38100">
+              <a:solidFill>
+                <a:schemeClr val="accent2"/>
+              </a:solidFill>
+              <a:prstDash val="lgDashDotDot"/>
+              <a:tailEnd type="arrow"/>
+            </a:ln>
+          </p:spPr>
+          <p:style>
+            <a:lnRef idx="1">
+              <a:schemeClr val="accent1"/>
+            </a:lnRef>
+            <a:fillRef idx="0">
+              <a:schemeClr val="accent1"/>
+            </a:fillRef>
+            <a:effectRef idx="0">
+              <a:schemeClr val="accent1"/>
+            </a:effectRef>
+            <a:fontRef idx="minor">
+              <a:schemeClr val="tx1"/>
+            </a:fontRef>
+          </p:style>
+        </p:cxnSp>
+        <p:sp>
+          <p:nvSpPr>
+            <p:cNvPr id="64" name="TextBox 63"/>
+            <p:cNvSpPr txBox="1"/>
+            <p:nvPr/>
+          </p:nvSpPr>
+          <p:spPr>
+            <a:xfrm>
+              <a:off x="1785163" y="3733800"/>
+              <a:ext cx="1600200" cy="253916"/>
+            </a:xfrm>
+            <a:prstGeom prst="rect">
+              <a:avLst/>
+            </a:prstGeom>
+            <a:noFill/>
+          </p:spPr>
+          <p:txBody>
+            <a:bodyPr wrap="square" rtlCol="0">
+              <a:spAutoFit/>
+            </a:bodyPr>
+            <a:lstStyle/>
+            <a:p>
+              <a:pPr algn="ctr"/>
+              <a:r>
+                <a:rPr lang="en-US" sz="1050" dirty="0" smtClean="0"/>
+                <a:t>Show recommendation</a:t>
+              </a:r>
+              <a:endParaRPr lang="en-US" sz="1050" dirty="0"/>
+            </a:p>
+          </p:txBody>
+        </p:sp>
+      </p:grpSp>
+    </p:spTree>
+    <p:extLst>
+      <p:ext uri="{BB962C8B-B14F-4D97-AF65-F5344CB8AC3E}">
+        <p14:creationId xmlns:p14="http://schemas.microsoft.com/office/powerpoint/2010/main" val="881372906"/>
       </p:ext>
     </p:extLst>
   </p:cSld>

</xml_diff>